<commit_message>
added davids comments for lecture 17
</commit_message>
<xml_diff>
--- a/Win2018/assets/lecture17/lecture17.pptx
+++ b/Win2018/assets/lecture17/lecture17.pptx
@@ -197,7 +197,7 @@
           <a:p>
             <a:fld id="{105AC71C-0662-E043-AC72-3255BC99F799}" type="datetimeFigureOut">
               <a:rPr lang="en-US" smtClean="0"/>
-              <a:t>3/6/18</a:t>
+              <a:t>3/14/18</a:t>
             </a:fld>
             <a:endParaRPr lang="en-US"/>
           </a:p>
@@ -595,7 +595,7 @@
           <a:p>
             <a:fld id="{B2DDCCA5-40EF-9A45-AE4D-E3567D1F429F}" type="datetimeFigureOut">
               <a:rPr lang="en-US" smtClean="0"/>
-              <a:t>3/6/18</a:t>
+              <a:t>3/14/18</a:t>
             </a:fld>
             <a:endParaRPr lang="en-US"/>
           </a:p>
@@ -760,7 +760,7 @@
           <a:p>
             <a:fld id="{B2DDCCA5-40EF-9A45-AE4D-E3567D1F429F}" type="datetimeFigureOut">
               <a:rPr lang="en-US" smtClean="0"/>
-              <a:t>3/6/18</a:t>
+              <a:t>3/14/18</a:t>
             </a:fld>
             <a:endParaRPr lang="en-US"/>
           </a:p>
@@ -935,7 +935,7 @@
           <a:p>
             <a:fld id="{B2DDCCA5-40EF-9A45-AE4D-E3567D1F429F}" type="datetimeFigureOut">
               <a:rPr lang="en-US" smtClean="0"/>
-              <a:t>3/6/18</a:t>
+              <a:t>3/14/18</a:t>
             </a:fld>
             <a:endParaRPr lang="en-US"/>
           </a:p>
@@ -1100,7 +1100,7 @@
           <a:p>
             <a:fld id="{B2DDCCA5-40EF-9A45-AE4D-E3567D1F429F}" type="datetimeFigureOut">
               <a:rPr lang="en-US" smtClean="0"/>
-              <a:t>3/6/18</a:t>
+              <a:t>3/14/18</a:t>
             </a:fld>
             <a:endParaRPr lang="en-US"/>
           </a:p>
@@ -1339,7 +1339,7 @@
           <a:p>
             <a:fld id="{B2DDCCA5-40EF-9A45-AE4D-E3567D1F429F}" type="datetimeFigureOut">
               <a:rPr lang="en-US" smtClean="0"/>
-              <a:t>3/6/18</a:t>
+              <a:t>3/14/18</a:t>
             </a:fld>
             <a:endParaRPr lang="en-US"/>
           </a:p>
@@ -1566,7 +1566,7 @@
           <a:p>
             <a:fld id="{B2DDCCA5-40EF-9A45-AE4D-E3567D1F429F}" type="datetimeFigureOut">
               <a:rPr lang="en-US" smtClean="0"/>
-              <a:t>3/6/18</a:t>
+              <a:t>3/14/18</a:t>
             </a:fld>
             <a:endParaRPr lang="en-US"/>
           </a:p>
@@ -1928,7 +1928,7 @@
           <a:p>
             <a:fld id="{B2DDCCA5-40EF-9A45-AE4D-E3567D1F429F}" type="datetimeFigureOut">
               <a:rPr lang="en-US" smtClean="0"/>
-              <a:t>3/6/18</a:t>
+              <a:t>3/14/18</a:t>
             </a:fld>
             <a:endParaRPr lang="en-US"/>
           </a:p>
@@ -2041,7 +2041,7 @@
           <a:p>
             <a:fld id="{B2DDCCA5-40EF-9A45-AE4D-E3567D1F429F}" type="datetimeFigureOut">
               <a:rPr lang="en-US" smtClean="0"/>
-              <a:t>3/6/18</a:t>
+              <a:t>3/14/18</a:t>
             </a:fld>
             <a:endParaRPr lang="en-US"/>
           </a:p>
@@ -2131,7 +2131,7 @@
           <a:p>
             <a:fld id="{B2DDCCA5-40EF-9A45-AE4D-E3567D1F429F}" type="datetimeFigureOut">
               <a:rPr lang="en-US" smtClean="0"/>
-              <a:t>3/6/18</a:t>
+              <a:t>3/14/18</a:t>
             </a:fld>
             <a:endParaRPr lang="en-US"/>
           </a:p>
@@ -2403,7 +2403,7 @@
           <a:p>
             <a:fld id="{B2DDCCA5-40EF-9A45-AE4D-E3567D1F429F}" type="datetimeFigureOut">
               <a:rPr lang="en-US" smtClean="0"/>
-              <a:t>3/6/18</a:t>
+              <a:t>3/14/18</a:t>
             </a:fld>
             <a:endParaRPr lang="en-US"/>
           </a:p>
@@ -2655,7 +2655,7 @@
           <a:p>
             <a:fld id="{B2DDCCA5-40EF-9A45-AE4D-E3567D1F429F}" type="datetimeFigureOut">
               <a:rPr lang="en-US" smtClean="0"/>
-              <a:t>3/6/18</a:t>
+              <a:t>3/14/18</a:t>
             </a:fld>
             <a:endParaRPr lang="en-US"/>
           </a:p>
@@ -2863,7 +2863,7 @@
           <a:p>
             <a:fld id="{B2DDCCA5-40EF-9A45-AE4D-E3567D1F429F}" type="datetimeFigureOut">
               <a:rPr lang="en-US" smtClean="0"/>
-              <a:t>3/6/18</a:t>
+              <a:t>3/14/18</a:t>
             </a:fld>
             <a:endParaRPr lang="en-US"/>
           </a:p>
@@ -3432,8 +3432,8 @@
           </a:p>
         </p:txBody>
       </p:sp>
-      <mc:AlternateContent xmlns:mc="http://schemas.openxmlformats.org/markup-compatibility/2006">
-        <mc:Choice xmlns:a14="http://schemas.microsoft.com/office/drawing/2010/main" Requires="a14">
+      <mc:AlternateContent xmlns:mc="http://schemas.openxmlformats.org/markup-compatibility/2006" xmlns:a14="http://schemas.microsoft.com/office/drawing/2010/main">
+        <mc:Choice Requires="a14">
           <p:sp>
             <p:nvSpPr>
               <p:cNvPr id="13" name="TextBox 12"/>
@@ -3573,7 +3573,7 @@
             </p:txBody>
           </p:sp>
         </mc:Choice>
-        <mc:Fallback>
+        <mc:Fallback xmlns="">
           <p:sp>
             <p:nvSpPr>
               <p:cNvPr id="13" name="TextBox 12"/>
@@ -3897,9 +3897,10 @@
           <a:p>
             <a:pPr algn="ctr"/>
             <a:r>
-              <a:rPr lang="en-US" dirty="0"/>
-              <a:t>Significance threshold</a:t>
-            </a:r>
+              <a:rPr lang="en-US"/>
+              <a:t>Significant transcripts</a:t>
+            </a:r>
+            <a:endParaRPr lang="en-US" dirty="0"/>
           </a:p>
         </p:txBody>
       </p:sp>
@@ -4138,8 +4139,8 @@
           </a:p>
         </p:txBody>
       </p:sp>
-      <mc:AlternateContent xmlns:mc="http://schemas.openxmlformats.org/markup-compatibility/2006">
-        <mc:Choice xmlns:a14="http://schemas.microsoft.com/office/drawing/2010/main" Requires="a14">
+      <mc:AlternateContent xmlns:mc="http://schemas.openxmlformats.org/markup-compatibility/2006" xmlns:a14="http://schemas.microsoft.com/office/drawing/2010/main">
+        <mc:Choice Requires="a14">
           <p:sp>
             <p:nvSpPr>
               <p:cNvPr id="40" name="TextBox 39">
@@ -4285,7 +4286,7 @@
             </p:txBody>
           </p:sp>
         </mc:Choice>
-        <mc:Fallback>
+        <mc:Fallback xmlns="">
           <p:sp>
             <p:nvSpPr>
               <p:cNvPr id="40" name="TextBox 39">

</xml_diff>